<commit_message>
bővítettem a ppt-t és megrajzoltam az unikornist.
</commit_message>
<xml_diff>
--- a/Donutclilcker tervezése SZM, VM.pptx
+++ b/Donutclilcker tervezése SZM, VM.pptx
@@ -245,7 +245,7 @@
           <a:effectLst/>
           <a:extLst>
             <a:ext uri="{91240B29-F687-4f45-9708-019B960494DF}">
-              <a14:hiddenLine xmlns="" xmlns:a14="http://schemas.microsoft.com/office/drawing/2010/main" w="9525">
+              <a14:hiddenLine xmlns:a14="http://schemas.microsoft.com/office/drawing/2010/main" xmlns="" w="9525">
                 <a:solidFill>
                   <a:srgbClr val="000000"/>
                 </a:solidFill>
@@ -437,7 +437,7 @@
           <a:p>
             <a:fld id="{DD51C564-B4E2-4097-88A6-AD370EF8463A}" type="datetimeFigureOut">
               <a:rPr lang="hu-HU" smtClean="0"/>
-              <a:t>2021. 09. 16.</a:t>
+              <a:t>2021. 09. 23.</a:t>
             </a:fld>
             <a:endParaRPr lang="hu-HU"/>
           </a:p>
@@ -495,6 +495,9 @@
   <p:clrMapOvr>
     <a:masterClrMapping/>
   </p:clrMapOvr>
+  <p:transition spd="slow">
+    <p:push dir="u"/>
+  </p:transition>
 </p:sldLayout>
 </file>
 
@@ -755,7 +758,7 @@
           <a:p>
             <a:fld id="{DD51C564-B4E2-4097-88A6-AD370EF8463A}" type="datetimeFigureOut">
               <a:rPr lang="hu-HU" smtClean="0"/>
-              <a:t>2021. 09. 16.</a:t>
+              <a:t>2021. 09. 23.</a:t>
             </a:fld>
             <a:endParaRPr lang="hu-HU"/>
           </a:p>
@@ -813,6 +816,9 @@
   <p:clrMapOvr>
     <a:masterClrMapping/>
   </p:clrMapOvr>
+  <p:transition spd="slow">
+    <p:push dir="u"/>
+  </p:transition>
 </p:sldLayout>
 </file>
 
@@ -1243,7 +1249,7 @@
           <a:p>
             <a:fld id="{DD51C564-B4E2-4097-88A6-AD370EF8463A}" type="datetimeFigureOut">
               <a:rPr lang="hu-HU" smtClean="0"/>
-              <a:t>2021. 09. 16.</a:t>
+              <a:t>2021. 09. 23.</a:t>
             </a:fld>
             <a:endParaRPr lang="hu-HU"/>
           </a:p>
@@ -1301,6 +1307,9 @@
   <p:clrMapOvr>
     <a:masterClrMapping/>
   </p:clrMapOvr>
+  <p:transition spd="slow">
+    <p:push dir="u"/>
+  </p:transition>
 </p:sldLayout>
 </file>
 
@@ -1612,7 +1621,7 @@
           <a:p>
             <a:fld id="{DD51C564-B4E2-4097-88A6-AD370EF8463A}" type="datetimeFigureOut">
               <a:rPr lang="hu-HU" smtClean="0"/>
-              <a:t>2021. 09. 16.</a:t>
+              <a:t>2021. 09. 23.</a:t>
             </a:fld>
             <a:endParaRPr lang="hu-HU"/>
           </a:p>
@@ -1670,6 +1679,9 @@
   <p:clrMapOvr>
     <a:masterClrMapping/>
   </p:clrMapOvr>
+  <p:transition spd="slow">
+    <p:push dir="u"/>
+  </p:transition>
 </p:sldLayout>
 </file>
 
@@ -1767,7 +1779,7 @@
           <a:ln/>
           <a:extLst>
             <a:ext uri="{91240B29-F687-4f45-9708-019B960494DF}">
-              <a14:hiddenLine xmlns="" xmlns:a14="http://schemas.microsoft.com/office/drawing/2010/main" w="9525">
+              <a14:hiddenLine xmlns:a14="http://schemas.microsoft.com/office/drawing/2010/main" xmlns="" w="9525">
                 <a:solidFill>
                   <a:srgbClr val="000000"/>
                 </a:solidFill>
@@ -1885,7 +1897,7 @@
           <a:p>
             <a:fld id="{DD51C564-B4E2-4097-88A6-AD370EF8463A}" type="datetimeFigureOut">
               <a:rPr lang="hu-HU" smtClean="0"/>
-              <a:t>2021. 09. 16.</a:t>
+              <a:t>2021. 09. 23.</a:t>
             </a:fld>
             <a:endParaRPr lang="hu-HU"/>
           </a:p>
@@ -1943,6 +1955,9 @@
   <p:clrMapOvr>
     <a:masterClrMapping/>
   </p:clrMapOvr>
+  <p:transition spd="slow">
+    <p:push dir="u"/>
+  </p:transition>
 </p:sldLayout>
 </file>
 
@@ -2042,7 +2057,7 @@
           <a:ln/>
           <a:extLst>
             <a:ext uri="{91240B29-F687-4f45-9708-019B960494DF}">
-              <a14:hiddenLine xmlns="" xmlns:a14="http://schemas.microsoft.com/office/drawing/2010/main" w="9525">
+              <a14:hiddenLine xmlns:a14="http://schemas.microsoft.com/office/drawing/2010/main" xmlns="" w="9525">
                 <a:solidFill>
                   <a:srgbClr val="000000"/>
                 </a:solidFill>
@@ -2170,7 +2185,7 @@
           <a:p>
             <a:fld id="{DD51C564-B4E2-4097-88A6-AD370EF8463A}" type="datetimeFigureOut">
               <a:rPr lang="hu-HU" smtClean="0"/>
-              <a:t>2021. 09. 16.</a:t>
+              <a:t>2021. 09. 23.</a:t>
             </a:fld>
             <a:endParaRPr lang="hu-HU"/>
           </a:p>
@@ -2228,6 +2243,9 @@
   <p:clrMapOvr>
     <a:masterClrMapping/>
   </p:clrMapOvr>
+  <p:transition spd="slow">
+    <p:push dir="u"/>
+  </p:transition>
 </p:sldLayout>
 </file>
 
@@ -2325,7 +2343,7 @@
           <a:ln/>
           <a:extLst>
             <a:ext uri="{91240B29-F687-4f45-9708-019B960494DF}">
-              <a14:hiddenLine xmlns="" xmlns:a14="http://schemas.microsoft.com/office/drawing/2010/main" w="9525">
+              <a14:hiddenLine xmlns:a14="http://schemas.microsoft.com/office/drawing/2010/main" xmlns="" w="9525">
                 <a:solidFill>
                   <a:srgbClr val="000000"/>
                 </a:solidFill>
@@ -2453,7 +2471,7 @@
           <a:p>
             <a:fld id="{DD51C564-B4E2-4097-88A6-AD370EF8463A}" type="datetimeFigureOut">
               <a:rPr lang="hu-HU" smtClean="0"/>
-              <a:t>2021. 09. 16.</a:t>
+              <a:t>2021. 09. 23.</a:t>
             </a:fld>
             <a:endParaRPr lang="hu-HU"/>
           </a:p>
@@ -2511,6 +2529,9 @@
   <p:clrMapOvr>
     <a:masterClrMapping/>
   </p:clrMapOvr>
+  <p:transition spd="slow">
+    <p:push dir="u"/>
+  </p:transition>
 </p:sldLayout>
 </file>
 
@@ -2796,7 +2817,7 @@
           <a:p>
             <a:fld id="{DD51C564-B4E2-4097-88A6-AD370EF8463A}" type="datetimeFigureOut">
               <a:rPr lang="hu-HU" smtClean="0"/>
-              <a:t>2021. 09. 16.</a:t>
+              <a:t>2021. 09. 23.</a:t>
             </a:fld>
             <a:endParaRPr lang="hu-HU"/>
           </a:p>
@@ -2854,6 +2875,9 @@
   <p:clrMapOvr>
     <a:masterClrMapping/>
   </p:clrMapOvr>
+  <p:transition spd="slow">
+    <p:push dir="u"/>
+  </p:transition>
 </p:sldLayout>
 </file>
 
@@ -2951,7 +2975,7 @@
           <a:ln/>
           <a:extLst>
             <a:ext uri="{91240B29-F687-4f45-9708-019B960494DF}">
-              <a14:hiddenLine xmlns="" xmlns:a14="http://schemas.microsoft.com/office/drawing/2010/main" w="9525">
+              <a14:hiddenLine xmlns:a14="http://schemas.microsoft.com/office/drawing/2010/main" xmlns="" w="9525">
                 <a:solidFill>
                   <a:srgbClr val="000000"/>
                 </a:solidFill>
@@ -3135,7 +3159,7 @@
           <a:p>
             <a:fld id="{DD51C564-B4E2-4097-88A6-AD370EF8463A}" type="datetimeFigureOut">
               <a:rPr lang="hu-HU" smtClean="0"/>
-              <a:t>2021. 09. 16.</a:t>
+              <a:t>2021. 09. 23.</a:t>
             </a:fld>
             <a:endParaRPr lang="hu-HU"/>
           </a:p>
@@ -3193,6 +3217,9 @@
   <p:clrMapOvr>
     <a:masterClrMapping/>
   </p:clrMapOvr>
+  <p:transition spd="slow">
+    <p:push dir="u"/>
+  </p:transition>
 </p:sldLayout>
 </file>
 
@@ -3290,7 +3317,7 @@
           <a:ln/>
           <a:extLst>
             <a:ext uri="{91240B29-F687-4f45-9708-019B960494DF}">
-              <a14:hiddenLine xmlns="" xmlns:a14="http://schemas.microsoft.com/office/drawing/2010/main" w="9525">
+              <a14:hiddenLine xmlns:a14="http://schemas.microsoft.com/office/drawing/2010/main" xmlns="" w="9525">
                 <a:solidFill>
                   <a:srgbClr val="000000"/>
                 </a:solidFill>
@@ -3612,7 +3639,7 @@
           <a:p>
             <a:fld id="{DD51C564-B4E2-4097-88A6-AD370EF8463A}" type="datetimeFigureOut">
               <a:rPr lang="hu-HU" smtClean="0"/>
-              <a:t>2021. 09. 16.</a:t>
+              <a:t>2021. 09. 23.</a:t>
             </a:fld>
             <a:endParaRPr lang="hu-HU"/>
           </a:p>
@@ -3670,6 +3697,9 @@
   <p:clrMapOvr>
     <a:masterClrMapping/>
   </p:clrMapOvr>
+  <p:transition spd="slow">
+    <p:push dir="u"/>
+  </p:transition>
 </p:sldLayout>
 </file>
 
@@ -3767,7 +3797,7 @@
           <a:ln/>
           <a:extLst>
             <a:ext uri="{91240B29-F687-4f45-9708-019B960494DF}">
-              <a14:hiddenLine xmlns="" xmlns:a14="http://schemas.microsoft.com/office/drawing/2010/main" w="9525">
+              <a14:hiddenLine xmlns:a14="http://schemas.microsoft.com/office/drawing/2010/main" xmlns="" w="9525">
                 <a:solidFill>
                   <a:srgbClr val="000000"/>
                 </a:solidFill>
@@ -3833,7 +3863,7 @@
           <a:p>
             <a:fld id="{DD51C564-B4E2-4097-88A6-AD370EF8463A}" type="datetimeFigureOut">
               <a:rPr lang="hu-HU" smtClean="0"/>
-              <a:t>2021. 09. 16.</a:t>
+              <a:t>2021. 09. 23.</a:t>
             </a:fld>
             <a:endParaRPr lang="hu-HU"/>
           </a:p>
@@ -3891,6 +3921,9 @@
   <p:clrMapOvr>
     <a:masterClrMapping/>
   </p:clrMapOvr>
+  <p:transition spd="slow">
+    <p:push dir="u"/>
+  </p:transition>
 </p:sldLayout>
 </file>
 
@@ -3928,7 +3961,7 @@
           <a:p>
             <a:fld id="{DD51C564-B4E2-4097-88A6-AD370EF8463A}" type="datetimeFigureOut">
               <a:rPr lang="hu-HU" smtClean="0"/>
-              <a:t>2021. 09. 16.</a:t>
+              <a:t>2021. 09. 23.</a:t>
             </a:fld>
             <a:endParaRPr lang="hu-HU"/>
           </a:p>
@@ -3986,6 +4019,9 @@
   <p:clrMapOvr>
     <a:masterClrMapping/>
   </p:clrMapOvr>
+  <p:transition spd="slow">
+    <p:push dir="u"/>
+  </p:transition>
 </p:sldLayout>
 </file>
 
@@ -4196,7 +4232,7 @@
           <a:ln/>
           <a:extLst>
             <a:ext uri="{91240B29-F687-4f45-9708-019B960494DF}">
-              <a14:hiddenLine xmlns="" xmlns:a14="http://schemas.microsoft.com/office/drawing/2010/main" w="9525">
+              <a14:hiddenLine xmlns:a14="http://schemas.microsoft.com/office/drawing/2010/main" xmlns="" w="9525">
                 <a:solidFill>
                   <a:srgbClr val="000000"/>
                 </a:solidFill>
@@ -4395,7 +4431,7 @@
           <a:p>
             <a:fld id="{DD51C564-B4E2-4097-88A6-AD370EF8463A}" type="datetimeFigureOut">
               <a:rPr lang="hu-HU" smtClean="0"/>
-              <a:t>2021. 09. 16.</a:t>
+              <a:t>2021. 09. 23.</a:t>
             </a:fld>
             <a:endParaRPr lang="hu-HU"/>
           </a:p>
@@ -4453,6 +4489,9 @@
   <p:clrMapOvr>
     <a:masterClrMapping/>
   </p:clrMapOvr>
+  <p:transition spd="slow">
+    <p:push dir="u"/>
+  </p:transition>
 </p:sldLayout>
 </file>
 
@@ -4708,7 +4747,7 @@
           <a:p>
             <a:fld id="{DD51C564-B4E2-4097-88A6-AD370EF8463A}" type="datetimeFigureOut">
               <a:rPr lang="hu-HU" smtClean="0"/>
-              <a:t>2021. 09. 16.</a:t>
+              <a:t>2021. 09. 23.</a:t>
             </a:fld>
             <a:endParaRPr lang="hu-HU"/>
           </a:p>
@@ -4776,6 +4815,9 @@
   <p:clrMapOvr>
     <a:masterClrMapping/>
   </p:clrMapOvr>
+  <p:transition spd="slow">
+    <p:push dir="u"/>
+  </p:transition>
 </p:sldLayout>
 </file>
 
@@ -4978,7 +5020,7 @@
           <a:p>
             <a:fld id="{DD51C564-B4E2-4097-88A6-AD370EF8463A}" type="datetimeFigureOut">
               <a:rPr lang="hu-HU" smtClean="0"/>
-              <a:t>2021. 09. 16.</a:t>
+              <a:t>2021. 09. 23.</a:t>
             </a:fld>
             <a:endParaRPr lang="hu-HU"/>
           </a:p>
@@ -5047,6 +5089,9 @@
     <p:sldLayoutId id="2147483673" r:id="rId13"/>
     <p:sldLayoutId id="2147483674" r:id="rId14"/>
   </p:sldLayoutIdLst>
+  <p:transition spd="slow">
+    <p:push dir="u"/>
+  </p:transition>
   <p:txStyles>
     <p:titleStyle>
       <a:lvl1pPr algn="l" defTabSz="457200" rtl="0" eaLnBrk="1" latinLnBrk="0" hangingPunct="1">
@@ -5506,6 +5551,9 @@
   <p:clrMapOvr>
     <a:masterClrMapping/>
   </p:clrMapOvr>
+  <p:transition spd="slow">
+    <p:push dir="u"/>
+  </p:transition>
 </p:sld>
 </file>
 
@@ -5598,6 +5646,9 @@
   <p:clrMapOvr>
     <a:masterClrMapping/>
   </p:clrMapOvr>
+  <p:transition spd="slow">
+    <p:push dir="u"/>
+  </p:transition>
 </p:sld>
 </file>
 
@@ -5687,6 +5738,36 @@
           </a:p>
         </p:txBody>
       </p:sp>
+      <p:pic>
+        <p:nvPicPr>
+          <p:cNvPr id="5" name="Kép 4">
+            <a:extLst>
+              <a:ext uri="{FF2B5EF4-FFF2-40B4-BE49-F238E27FC236}">
+                <a16:creationId xmlns:a16="http://schemas.microsoft.com/office/drawing/2014/main" id="{3538026E-2794-44CC-ABD9-D6F9DF52AC33}"/>
+              </a:ext>
+            </a:extLst>
+          </p:cNvPr>
+          <p:cNvPicPr>
+            <a:picLocks noChangeAspect="1"/>
+          </p:cNvPicPr>
+          <p:nvPr/>
+        </p:nvPicPr>
+        <p:blipFill>
+          <a:blip r:embed="rId2"/>
+          <a:stretch>
+            <a:fillRect/>
+          </a:stretch>
+        </p:blipFill>
+        <p:spPr>
+          <a:xfrm>
+            <a:off x="2949575" y="2771928"/>
+            <a:ext cx="6292850" cy="3514572"/>
+          </a:xfrm>
+          <a:prstGeom prst="rect">
+            <a:avLst/>
+          </a:prstGeom>
+        </p:spPr>
+      </p:pic>
     </p:spTree>
     <p:extLst>
       <p:ext uri="{BB962C8B-B14F-4D97-AF65-F5344CB8AC3E}">
@@ -5697,6 +5778,9 @@
   <p:clrMapOvr>
     <a:masterClrMapping/>
   </p:clrMapOvr>
+  <p:transition spd="slow">
+    <p:push dir="u"/>
+  </p:transition>
 </p:sld>
 </file>
 
@@ -5738,7 +5822,10 @@
           <a:bodyPr/>
           <a:lstStyle/>
           <a:p>
-            <a:endParaRPr lang="hu-HU"/>
+            <a:r>
+              <a:rPr lang="hu-HU" dirty="0"/>
+              <a:t>A játék</a:t>
+            </a:r>
           </a:p>
         </p:txBody>
       </p:sp>
@@ -5763,7 +5850,7 @@
           <a:bodyPr/>
           <a:lstStyle/>
           <a:p>
-            <a:endParaRPr lang="hu-HU"/>
+            <a:endParaRPr lang="hu-HU" dirty="0"/>
           </a:p>
         </p:txBody>
       </p:sp>
@@ -5777,6 +5864,9 @@
   <p:clrMapOvr>
     <a:masterClrMapping/>
   </p:clrMapOvr>
+  <p:transition spd="slow">
+    <p:push dir="u"/>
+  </p:transition>
 </p:sld>
 </file>
 

</xml_diff>